<commit_message>
Changed first page title
</commit_message>
<xml_diff>
--- a/PVC Blade Instructions.pptx
+++ b/PVC Blade Instructions.pptx
@@ -207,7 +207,7 @@
           <a:p>
             <a:fld id="{F35B8150-31DB-4606-AFD8-3FF92C38102E}" type="datetimeFigureOut">
               <a:rPr lang="en-GB" smtClean="0"/>
-              <a:t>01/09/16</a:t>
+              <a:t>02/09/16</a:t>
             </a:fld>
             <a:endParaRPr lang="en-GB"/>
           </a:p>
@@ -1821,7 +1821,7 @@
           <a:p>
             <a:fld id="{08A990AC-294F-BB43-905A-395CCCA31A82}" type="datetimeFigureOut">
               <a:rPr lang="en-US" smtClean="0"/>
-              <a:t>01/09/16</a:t>
+              <a:t>02/09/16</a:t>
             </a:fld>
             <a:endParaRPr lang="en-US"/>
           </a:p>
@@ -1991,7 +1991,7 @@
           <a:p>
             <a:fld id="{08A990AC-294F-BB43-905A-395CCCA31A82}" type="datetimeFigureOut">
               <a:rPr lang="en-US" smtClean="0"/>
-              <a:t>01/09/16</a:t>
+              <a:t>02/09/16</a:t>
             </a:fld>
             <a:endParaRPr lang="en-US"/>
           </a:p>
@@ -2171,7 +2171,7 @@
           <a:p>
             <a:fld id="{08A990AC-294F-BB43-905A-395CCCA31A82}" type="datetimeFigureOut">
               <a:rPr lang="en-US" smtClean="0"/>
-              <a:t>01/09/16</a:t>
+              <a:t>02/09/16</a:t>
             </a:fld>
             <a:endParaRPr lang="en-US"/>
           </a:p>
@@ -2341,7 +2341,7 @@
           <a:p>
             <a:fld id="{08A990AC-294F-BB43-905A-395CCCA31A82}" type="datetimeFigureOut">
               <a:rPr lang="en-US" smtClean="0"/>
-              <a:t>01/09/16</a:t>
+              <a:t>02/09/16</a:t>
             </a:fld>
             <a:endParaRPr lang="en-US"/>
           </a:p>
@@ -2587,7 +2587,7 @@
           <a:p>
             <a:fld id="{08A990AC-294F-BB43-905A-395CCCA31A82}" type="datetimeFigureOut">
               <a:rPr lang="en-US" smtClean="0"/>
-              <a:t>01/09/16</a:t>
+              <a:t>02/09/16</a:t>
             </a:fld>
             <a:endParaRPr lang="en-US"/>
           </a:p>
@@ -2875,7 +2875,7 @@
           <a:p>
             <a:fld id="{08A990AC-294F-BB43-905A-395CCCA31A82}" type="datetimeFigureOut">
               <a:rPr lang="en-US" smtClean="0"/>
-              <a:t>01/09/16</a:t>
+              <a:t>02/09/16</a:t>
             </a:fld>
             <a:endParaRPr lang="en-US"/>
           </a:p>
@@ -3297,7 +3297,7 @@
           <a:p>
             <a:fld id="{08A990AC-294F-BB43-905A-395CCCA31A82}" type="datetimeFigureOut">
               <a:rPr lang="en-US" smtClean="0"/>
-              <a:t>01/09/16</a:t>
+              <a:t>02/09/16</a:t>
             </a:fld>
             <a:endParaRPr lang="en-US"/>
           </a:p>
@@ -3415,7 +3415,7 @@
           <a:p>
             <a:fld id="{08A990AC-294F-BB43-905A-395CCCA31A82}" type="datetimeFigureOut">
               <a:rPr lang="en-US" smtClean="0"/>
-              <a:t>01/09/16</a:t>
+              <a:t>02/09/16</a:t>
             </a:fld>
             <a:endParaRPr lang="en-US"/>
           </a:p>
@@ -3510,7 +3510,7 @@
           <a:p>
             <a:fld id="{08A990AC-294F-BB43-905A-395CCCA31A82}" type="datetimeFigureOut">
               <a:rPr lang="en-US" smtClean="0"/>
-              <a:t>01/09/16</a:t>
+              <a:t>02/09/16</a:t>
             </a:fld>
             <a:endParaRPr lang="en-US"/>
           </a:p>
@@ -3787,7 +3787,7 @@
           <a:p>
             <a:fld id="{08A990AC-294F-BB43-905A-395CCCA31A82}" type="datetimeFigureOut">
               <a:rPr lang="en-US" smtClean="0"/>
-              <a:t>01/09/16</a:t>
+              <a:t>02/09/16</a:t>
             </a:fld>
             <a:endParaRPr lang="en-US"/>
           </a:p>
@@ -4040,7 +4040,7 @@
           <a:p>
             <a:fld id="{08A990AC-294F-BB43-905A-395CCCA31A82}" type="datetimeFigureOut">
               <a:rPr lang="en-US" smtClean="0"/>
-              <a:t>01/09/16</a:t>
+              <a:t>02/09/16</a:t>
             </a:fld>
             <a:endParaRPr lang="en-US"/>
           </a:p>
@@ -4253,7 +4253,7 @@
           <a:p>
             <a:fld id="{08A990AC-294F-BB43-905A-395CCCA31A82}" type="datetimeFigureOut">
               <a:rPr lang="en-US" smtClean="0"/>
-              <a:t>01/09/16</a:t>
+              <a:t>02/09/16</a:t>
             </a:fld>
             <a:endParaRPr lang="en-US"/>
           </a:p>
@@ -4644,8 +4644,16 @@
           <a:lstStyle/>
           <a:p>
             <a:r>
+              <a:rPr lang="en-US"/>
+              <a:t>T</a:t>
+            </a:r>
+            <a:r>
+              <a:rPr lang="en-US" smtClean="0"/>
+              <a:t>houghts </a:t>
+            </a:r>
+            <a:r>
               <a:rPr lang="en-US" dirty="0" smtClean="0"/>
-              <a:t>General thoughts and comments</a:t>
+              <a:t>and comments</a:t>
             </a:r>
             <a:endParaRPr lang="en-US" dirty="0"/>
           </a:p>
@@ -4698,11 +4706,7 @@
           <a:p>
             <a:r>
               <a:rPr lang="en-US" dirty="0" smtClean="0"/>
-              <a:t>This affects the size of the dimension text when rescaled and I don’t know the solution to that</a:t>
-            </a:r>
-            <a:r>
-              <a:rPr lang="en-US" dirty="0" smtClean="0"/>
-              <a:t>.</a:t>
+              <a:t>This affects the size of the dimension text when rescaled and I don’t know the solution to that.</a:t>
             </a:r>
           </a:p>
           <a:p>
@@ -4804,7 +4808,6 @@
               <a:rPr lang="en-US" dirty="0"/>
               <a:t> do I tighten the nut first and then the coupling?</a:t>
             </a:r>
-            <a:endParaRPr lang="en-US" dirty="0"/>
           </a:p>
         </p:txBody>
       </p:sp>

</xml_diff>